<commit_message>
Iteraciones agregadas a documento
</commit_message>
<xml_diff>
--- a/PRESENTACIONTTII.pptx
+++ b/PRESENTACIONTTII.pptx
@@ -12033,7 +12033,7 @@
             </a:pPr>
             <a:r>
               <a:rPr lang="es-MX" dirty="0"/>
-              <a:t>Se desarrollaron las funciones que permiten a un usuario registrarse en la aplicación para poder iniciar sesión, y recuperar su contraseña en caso de olvidarla.</a:t>
+              <a:t>Implementamos una forma de restaurar la contraseña del usuario a través de la aplicación.</a:t>
             </a:r>
           </a:p>
         </p:txBody>
@@ -12073,7 +12073,7 @@
                 </a:solidFill>
                 <a:latin typeface="Bahnschrift SemiBold" panose="020B0502040204020203" pitchFamily="34" charset="0"/>
               </a:rPr>
-              <a:t>Objetivo: Implementar gestión de usuarios en la aplicación</a:t>
+              <a:t>Objetivo: Implementar recuperación de contraseña dentro de la aplicación</a:t>
             </a:r>
           </a:p>
         </p:txBody>
@@ -12164,7 +12164,7 @@
             </a:pPr>
             <a:r>
               <a:rPr lang="es-MX" dirty="0"/>
-              <a:t>Se desarrolló la función para permitir creación de proyectos, mismos que contendrían escenarios.</a:t>
+              <a:t>Se desarrolló la función para permitir la creación de proyectos, mismos que contendrían escenarios.</a:t>
             </a:r>
           </a:p>
         </p:txBody>
@@ -12800,7 +12800,7 @@
             </a:pPr>
             <a:r>
               <a:rPr lang="es-ES" dirty="0"/>
-              <a:t>Se desarrollaron las funciones que permitían a un usuario usar los muebles previamente subidos a la plataforma web. También se agregaron funciones para poder seleccionar, borrar y ver precios de muebles.</a:t>
+              <a:t>Se desarrollaron las funciones que permiten a un usuario usar los muebles previamente subidos a la plataforma web. También se agregaron funciones para poder seleccionar, borrar y ver precios de muebles.</a:t>
             </a:r>
             <a:endParaRPr lang="es-MX" dirty="0"/>
           </a:p>

</xml_diff>